<commit_message>
Update deadline(before Sunday am 9:00)
</commit_message>
<xml_diff>
--- a/스터디_계획.pptx
+++ b/스터디_계획.pptx
@@ -10,7 +10,7 @@
   <p:sldIdLst>
     <p:sldId id="256" r:id="rId2"/>
     <p:sldId id="258" r:id="rId3"/>
-    <p:sldId id="257" r:id="rId4"/>
+    <p:sldId id="259" r:id="rId4"/>
   </p:sldIdLst>
   <p:sldSz cx="9144000" cy="6858000" type="screen4x3"/>
   <p:notesSz cx="6858000" cy="9144000"/>
@@ -109,6 +109,22 @@
       </a:defRPr>
     </a:lvl9pPr>
   </p:defaultTextStyle>
+  <p:extLst>
+    <p:ext uri="{EFAFB233-063F-42B5-8137-9DF3F51BA10A}">
+      <p15:sldGuideLst xmlns:p15="http://schemas.microsoft.com/office/powerpoint/2012/main">
+        <p15:guide id="1" orient="horz" pos="2160">
+          <p15:clr>
+            <a:srgbClr val="A4A3A4"/>
+          </p15:clr>
+        </p15:guide>
+        <p15:guide id="2" pos="2880">
+          <p15:clr>
+            <a:srgbClr val="A4A3A4"/>
+          </p15:clr>
+        </p15:guide>
+      </p15:sldGuideLst>
+    </p:ext>
+  </p:extLst>
 </p:presentation>
 </file>
 
@@ -258,38 +274,37 @@
           <a:p>
             <a:pPr lvl="0"/>
             <a:r>
-              <a:rPr lang="ko-KR" altLang="en-US" smtClean="0"/>
+              <a:rPr lang="ko-KR" altLang="en-US"/>
               <a:t>마스터 텍스트 스타일을 편집합니다</a:t>
             </a:r>
           </a:p>
           <a:p>
             <a:pPr lvl="1"/>
             <a:r>
-              <a:rPr lang="ko-KR" altLang="en-US" smtClean="0"/>
+              <a:rPr lang="ko-KR" altLang="en-US"/>
               <a:t>둘째 수준</a:t>
             </a:r>
           </a:p>
           <a:p>
             <a:pPr lvl="2"/>
             <a:r>
-              <a:rPr lang="ko-KR" altLang="en-US" smtClean="0"/>
+              <a:rPr lang="ko-KR" altLang="en-US"/>
               <a:t>셋째 수준</a:t>
             </a:r>
           </a:p>
           <a:p>
             <a:pPr lvl="3"/>
             <a:r>
-              <a:rPr lang="ko-KR" altLang="en-US" smtClean="0"/>
+              <a:rPr lang="ko-KR" altLang="en-US"/>
               <a:t>넷째 수준</a:t>
             </a:r>
           </a:p>
           <a:p>
             <a:pPr lvl="4"/>
             <a:r>
-              <a:rPr lang="ko-KR" altLang="en-US" smtClean="0"/>
+              <a:rPr lang="ko-KR" altLang="en-US"/>
               <a:t>다섯째 수준</a:t>
             </a:r>
-            <a:endParaRPr lang="ko-KR" altLang="en-US"/>
           </a:p>
         </p:txBody>
       </p:sp>
@@ -584,10 +599,9 @@
           <a:lstStyle/>
           <a:p>
             <a:r>
-              <a:rPr lang="ko-KR" altLang="en-US" smtClean="0"/>
+              <a:rPr lang="ko-KR" altLang="en-US"/>
               <a:t>마스터 제목 스타일 편집</a:t>
             </a:r>
-            <a:endParaRPr lang="ko-KR" altLang="en-US"/>
           </a:p>
         </p:txBody>
       </p:sp>
@@ -703,10 +717,9 @@
           </a:lstStyle>
           <a:p>
             <a:r>
-              <a:rPr lang="ko-KR" altLang="en-US" smtClean="0"/>
+              <a:rPr lang="ko-KR" altLang="en-US"/>
               <a:t>마스터 부제목 스타일 편집</a:t>
             </a:r>
-            <a:endParaRPr lang="ko-KR" altLang="en-US"/>
           </a:p>
         </p:txBody>
       </p:sp>
@@ -816,10 +829,9 @@
           <a:lstStyle/>
           <a:p>
             <a:r>
-              <a:rPr lang="ko-KR" altLang="en-US" smtClean="0"/>
+              <a:rPr lang="ko-KR" altLang="en-US"/>
               <a:t>마스터 제목 스타일 편집</a:t>
             </a:r>
-            <a:endParaRPr lang="ko-KR" altLang="en-US"/>
           </a:p>
         </p:txBody>
       </p:sp>
@@ -840,38 +852,37 @@
           <a:p>
             <a:pPr lvl="0"/>
             <a:r>
-              <a:rPr lang="ko-KR" altLang="en-US" smtClean="0"/>
+              <a:rPr lang="ko-KR" altLang="en-US"/>
               <a:t>마스터 텍스트 스타일을 편집합니다</a:t>
             </a:r>
           </a:p>
           <a:p>
             <a:pPr lvl="1"/>
             <a:r>
-              <a:rPr lang="ko-KR" altLang="en-US" smtClean="0"/>
+              <a:rPr lang="ko-KR" altLang="en-US"/>
               <a:t>둘째 수준</a:t>
             </a:r>
           </a:p>
           <a:p>
             <a:pPr lvl="2"/>
             <a:r>
-              <a:rPr lang="ko-KR" altLang="en-US" smtClean="0"/>
+              <a:rPr lang="ko-KR" altLang="en-US"/>
               <a:t>셋째 수준</a:t>
             </a:r>
           </a:p>
           <a:p>
             <a:pPr lvl="3"/>
             <a:r>
-              <a:rPr lang="ko-KR" altLang="en-US" smtClean="0"/>
+              <a:rPr lang="ko-KR" altLang="en-US"/>
               <a:t>넷째 수준</a:t>
             </a:r>
           </a:p>
           <a:p>
             <a:pPr lvl="4"/>
             <a:r>
-              <a:rPr lang="ko-KR" altLang="en-US" smtClean="0"/>
+              <a:rPr lang="ko-KR" altLang="en-US"/>
               <a:t>다섯째 수준</a:t>
             </a:r>
-            <a:endParaRPr lang="ko-KR" altLang="en-US"/>
           </a:p>
         </p:txBody>
       </p:sp>
@@ -986,10 +997,9 @@
           <a:lstStyle/>
           <a:p>
             <a:r>
-              <a:rPr lang="ko-KR" altLang="en-US" smtClean="0"/>
+              <a:rPr lang="ko-KR" altLang="en-US"/>
               <a:t>마스터 제목 스타일 편집</a:t>
             </a:r>
-            <a:endParaRPr lang="ko-KR" altLang="en-US"/>
           </a:p>
         </p:txBody>
       </p:sp>
@@ -1015,38 +1025,37 @@
           <a:p>
             <a:pPr lvl="0"/>
             <a:r>
-              <a:rPr lang="ko-KR" altLang="en-US" smtClean="0"/>
+              <a:rPr lang="ko-KR" altLang="en-US"/>
               <a:t>마스터 텍스트 스타일을 편집합니다</a:t>
             </a:r>
           </a:p>
           <a:p>
             <a:pPr lvl="1"/>
             <a:r>
-              <a:rPr lang="ko-KR" altLang="en-US" smtClean="0"/>
+              <a:rPr lang="ko-KR" altLang="en-US"/>
               <a:t>둘째 수준</a:t>
             </a:r>
           </a:p>
           <a:p>
             <a:pPr lvl="2"/>
             <a:r>
-              <a:rPr lang="ko-KR" altLang="en-US" smtClean="0"/>
+              <a:rPr lang="ko-KR" altLang="en-US"/>
               <a:t>셋째 수준</a:t>
             </a:r>
           </a:p>
           <a:p>
             <a:pPr lvl="3"/>
             <a:r>
-              <a:rPr lang="ko-KR" altLang="en-US" smtClean="0"/>
+              <a:rPr lang="ko-KR" altLang="en-US"/>
               <a:t>넷째 수준</a:t>
             </a:r>
           </a:p>
           <a:p>
             <a:pPr lvl="4"/>
             <a:r>
-              <a:rPr lang="ko-KR" altLang="en-US" smtClean="0"/>
+              <a:rPr lang="ko-KR" altLang="en-US"/>
               <a:t>다섯째 수준</a:t>
             </a:r>
-            <a:endParaRPr lang="ko-KR" altLang="en-US"/>
           </a:p>
         </p:txBody>
       </p:sp>
@@ -1156,10 +1165,9 @@
           <a:lstStyle/>
           <a:p>
             <a:r>
-              <a:rPr lang="ko-KR" altLang="en-US" smtClean="0"/>
+              <a:rPr lang="ko-KR" altLang="en-US"/>
               <a:t>마스터 제목 스타일 편집</a:t>
             </a:r>
-            <a:endParaRPr lang="ko-KR" altLang="en-US"/>
           </a:p>
         </p:txBody>
       </p:sp>
@@ -1180,38 +1188,37 @@
           <a:p>
             <a:pPr lvl="0"/>
             <a:r>
-              <a:rPr lang="ko-KR" altLang="en-US" smtClean="0"/>
+              <a:rPr lang="ko-KR" altLang="en-US"/>
               <a:t>마스터 텍스트 스타일을 편집합니다</a:t>
             </a:r>
           </a:p>
           <a:p>
             <a:pPr lvl="1"/>
             <a:r>
-              <a:rPr lang="ko-KR" altLang="en-US" smtClean="0"/>
+              <a:rPr lang="ko-KR" altLang="en-US"/>
               <a:t>둘째 수준</a:t>
             </a:r>
           </a:p>
           <a:p>
             <a:pPr lvl="2"/>
             <a:r>
-              <a:rPr lang="ko-KR" altLang="en-US" smtClean="0"/>
+              <a:rPr lang="ko-KR" altLang="en-US"/>
               <a:t>셋째 수준</a:t>
             </a:r>
           </a:p>
           <a:p>
             <a:pPr lvl="3"/>
             <a:r>
-              <a:rPr lang="ko-KR" altLang="en-US" smtClean="0"/>
+              <a:rPr lang="ko-KR" altLang="en-US"/>
               <a:t>넷째 수준</a:t>
             </a:r>
           </a:p>
           <a:p>
             <a:pPr lvl="4"/>
             <a:r>
-              <a:rPr lang="ko-KR" altLang="en-US" smtClean="0"/>
+              <a:rPr lang="ko-KR" altLang="en-US"/>
               <a:t>다섯째 수준</a:t>
             </a:r>
-            <a:endParaRPr lang="ko-KR" altLang="en-US"/>
           </a:p>
         </p:txBody>
       </p:sp>
@@ -1330,10 +1337,9 @@
           </a:lstStyle>
           <a:p>
             <a:r>
-              <a:rPr lang="ko-KR" altLang="en-US" smtClean="0"/>
+              <a:rPr lang="ko-KR" altLang="en-US"/>
               <a:t>마스터 제목 스타일 편집</a:t>
             </a:r>
-            <a:endParaRPr lang="ko-KR" altLang="en-US"/>
           </a:p>
         </p:txBody>
       </p:sp>
@@ -1450,7 +1456,7 @@
           <a:p>
             <a:pPr lvl="0"/>
             <a:r>
-              <a:rPr lang="ko-KR" altLang="en-US" smtClean="0"/>
+              <a:rPr lang="ko-KR" altLang="en-US"/>
               <a:t>마스터 텍스트 스타일을 편집합니다</a:t>
             </a:r>
           </a:p>
@@ -1562,10 +1568,9 @@
           <a:lstStyle/>
           <a:p>
             <a:r>
-              <a:rPr lang="ko-KR" altLang="en-US" smtClean="0"/>
+              <a:rPr lang="ko-KR" altLang="en-US"/>
               <a:t>마스터 제목 스타일 편집</a:t>
             </a:r>
-            <a:endParaRPr lang="ko-KR" altLang="en-US"/>
           </a:p>
         </p:txBody>
       </p:sp>
@@ -1619,38 +1624,37 @@
           <a:p>
             <a:pPr lvl="0"/>
             <a:r>
-              <a:rPr lang="ko-KR" altLang="en-US" smtClean="0"/>
+              <a:rPr lang="ko-KR" altLang="en-US"/>
               <a:t>마스터 텍스트 스타일을 편집합니다</a:t>
             </a:r>
           </a:p>
           <a:p>
             <a:pPr lvl="1"/>
             <a:r>
-              <a:rPr lang="ko-KR" altLang="en-US" smtClean="0"/>
+              <a:rPr lang="ko-KR" altLang="en-US"/>
               <a:t>둘째 수준</a:t>
             </a:r>
           </a:p>
           <a:p>
             <a:pPr lvl="2"/>
             <a:r>
-              <a:rPr lang="ko-KR" altLang="en-US" smtClean="0"/>
+              <a:rPr lang="ko-KR" altLang="en-US"/>
               <a:t>셋째 수준</a:t>
             </a:r>
           </a:p>
           <a:p>
             <a:pPr lvl="3"/>
             <a:r>
-              <a:rPr lang="ko-KR" altLang="en-US" smtClean="0"/>
+              <a:rPr lang="ko-KR" altLang="en-US"/>
               <a:t>넷째 수준</a:t>
             </a:r>
           </a:p>
           <a:p>
             <a:pPr lvl="4"/>
             <a:r>
-              <a:rPr lang="ko-KR" altLang="en-US" smtClean="0"/>
+              <a:rPr lang="ko-KR" altLang="en-US"/>
               <a:t>다섯째 수준</a:t>
             </a:r>
-            <a:endParaRPr lang="ko-KR" altLang="en-US"/>
           </a:p>
         </p:txBody>
       </p:sp>
@@ -1704,38 +1708,37 @@
           <a:p>
             <a:pPr lvl="0"/>
             <a:r>
-              <a:rPr lang="ko-KR" altLang="en-US" smtClean="0"/>
+              <a:rPr lang="ko-KR" altLang="en-US"/>
               <a:t>마스터 텍스트 스타일을 편집합니다</a:t>
             </a:r>
           </a:p>
           <a:p>
             <a:pPr lvl="1"/>
             <a:r>
-              <a:rPr lang="ko-KR" altLang="en-US" smtClean="0"/>
+              <a:rPr lang="ko-KR" altLang="en-US"/>
               <a:t>둘째 수준</a:t>
             </a:r>
           </a:p>
           <a:p>
             <a:pPr lvl="2"/>
             <a:r>
-              <a:rPr lang="ko-KR" altLang="en-US" smtClean="0"/>
+              <a:rPr lang="ko-KR" altLang="en-US"/>
               <a:t>셋째 수준</a:t>
             </a:r>
           </a:p>
           <a:p>
             <a:pPr lvl="3"/>
             <a:r>
-              <a:rPr lang="ko-KR" altLang="en-US" smtClean="0"/>
+              <a:rPr lang="ko-KR" altLang="en-US"/>
               <a:t>넷째 수준</a:t>
             </a:r>
           </a:p>
           <a:p>
             <a:pPr lvl="4"/>
             <a:r>
-              <a:rPr lang="ko-KR" altLang="en-US" smtClean="0"/>
+              <a:rPr lang="ko-KR" altLang="en-US"/>
               <a:t>다섯째 수준</a:t>
             </a:r>
-            <a:endParaRPr lang="ko-KR" altLang="en-US"/>
           </a:p>
         </p:txBody>
       </p:sp>
@@ -1849,10 +1852,9 @@
           </a:lstStyle>
           <a:p>
             <a:r>
-              <a:rPr lang="ko-KR" altLang="en-US" smtClean="0"/>
+              <a:rPr lang="ko-KR" altLang="en-US"/>
               <a:t>마스터 제목 스타일 편집</a:t>
             </a:r>
-            <a:endParaRPr lang="ko-KR" altLang="en-US"/>
           </a:p>
         </p:txBody>
       </p:sp>
@@ -1915,7 +1917,7 @@
           <a:p>
             <a:pPr lvl="0"/>
             <a:r>
-              <a:rPr lang="ko-KR" altLang="en-US" smtClean="0"/>
+              <a:rPr lang="ko-KR" altLang="en-US"/>
               <a:t>마스터 텍스트 스타일을 편집합니다</a:t>
             </a:r>
           </a:p>
@@ -1971,38 +1973,37 @@
           <a:p>
             <a:pPr lvl="0"/>
             <a:r>
-              <a:rPr lang="ko-KR" altLang="en-US" smtClean="0"/>
+              <a:rPr lang="ko-KR" altLang="en-US"/>
               <a:t>마스터 텍스트 스타일을 편집합니다</a:t>
             </a:r>
           </a:p>
           <a:p>
             <a:pPr lvl="1"/>
             <a:r>
-              <a:rPr lang="ko-KR" altLang="en-US" smtClean="0"/>
+              <a:rPr lang="ko-KR" altLang="en-US"/>
               <a:t>둘째 수준</a:t>
             </a:r>
           </a:p>
           <a:p>
             <a:pPr lvl="2"/>
             <a:r>
-              <a:rPr lang="ko-KR" altLang="en-US" smtClean="0"/>
+              <a:rPr lang="ko-KR" altLang="en-US"/>
               <a:t>셋째 수준</a:t>
             </a:r>
           </a:p>
           <a:p>
             <a:pPr lvl="3"/>
             <a:r>
-              <a:rPr lang="ko-KR" altLang="en-US" smtClean="0"/>
+              <a:rPr lang="ko-KR" altLang="en-US"/>
               <a:t>넷째 수준</a:t>
             </a:r>
           </a:p>
           <a:p>
             <a:pPr lvl="4"/>
             <a:r>
-              <a:rPr lang="ko-KR" altLang="en-US" smtClean="0"/>
+              <a:rPr lang="ko-KR" altLang="en-US"/>
               <a:t>다섯째 수준</a:t>
             </a:r>
-            <a:endParaRPr lang="ko-KR" altLang="en-US"/>
           </a:p>
         </p:txBody>
       </p:sp>
@@ -2065,7 +2066,7 @@
           <a:p>
             <a:pPr lvl="0"/>
             <a:r>
-              <a:rPr lang="ko-KR" altLang="en-US" smtClean="0"/>
+              <a:rPr lang="ko-KR" altLang="en-US"/>
               <a:t>마스터 텍스트 스타일을 편집합니다</a:t>
             </a:r>
           </a:p>
@@ -2121,38 +2122,37 @@
           <a:p>
             <a:pPr lvl="0"/>
             <a:r>
-              <a:rPr lang="ko-KR" altLang="en-US" smtClean="0"/>
+              <a:rPr lang="ko-KR" altLang="en-US"/>
               <a:t>마스터 텍스트 스타일을 편집합니다</a:t>
             </a:r>
           </a:p>
           <a:p>
             <a:pPr lvl="1"/>
             <a:r>
-              <a:rPr lang="ko-KR" altLang="en-US" smtClean="0"/>
+              <a:rPr lang="ko-KR" altLang="en-US"/>
               <a:t>둘째 수준</a:t>
             </a:r>
           </a:p>
           <a:p>
             <a:pPr lvl="2"/>
             <a:r>
-              <a:rPr lang="ko-KR" altLang="en-US" smtClean="0"/>
+              <a:rPr lang="ko-KR" altLang="en-US"/>
               <a:t>셋째 수준</a:t>
             </a:r>
           </a:p>
           <a:p>
             <a:pPr lvl="3"/>
             <a:r>
-              <a:rPr lang="ko-KR" altLang="en-US" smtClean="0"/>
+              <a:rPr lang="ko-KR" altLang="en-US"/>
               <a:t>넷째 수준</a:t>
             </a:r>
           </a:p>
           <a:p>
             <a:pPr lvl="4"/>
             <a:r>
-              <a:rPr lang="ko-KR" altLang="en-US" smtClean="0"/>
+              <a:rPr lang="ko-KR" altLang="en-US"/>
               <a:t>다섯째 수준</a:t>
             </a:r>
-            <a:endParaRPr lang="ko-KR" altLang="en-US"/>
           </a:p>
         </p:txBody>
       </p:sp>
@@ -2262,10 +2262,9 @@
           <a:lstStyle/>
           <a:p>
             <a:r>
-              <a:rPr lang="ko-KR" altLang="en-US" smtClean="0"/>
+              <a:rPr lang="ko-KR" altLang="en-US"/>
               <a:t>마스터 제목 스타일 편집</a:t>
             </a:r>
-            <a:endParaRPr lang="ko-KR" altLang="en-US"/>
           </a:p>
         </p:txBody>
       </p:sp>
@@ -2474,10 +2473,9 @@
           </a:lstStyle>
           <a:p>
             <a:r>
-              <a:rPr lang="ko-KR" altLang="en-US" smtClean="0"/>
+              <a:rPr lang="ko-KR" altLang="en-US"/>
               <a:t>마스터 제목 스타일 편집</a:t>
             </a:r>
-            <a:endParaRPr lang="ko-KR" altLang="en-US"/>
           </a:p>
         </p:txBody>
       </p:sp>
@@ -2531,38 +2529,37 @@
           <a:p>
             <a:pPr lvl="0"/>
             <a:r>
-              <a:rPr lang="ko-KR" altLang="en-US" smtClean="0"/>
+              <a:rPr lang="ko-KR" altLang="en-US"/>
               <a:t>마스터 텍스트 스타일을 편집합니다</a:t>
             </a:r>
           </a:p>
           <a:p>
             <a:pPr lvl="1"/>
             <a:r>
-              <a:rPr lang="ko-KR" altLang="en-US" smtClean="0"/>
+              <a:rPr lang="ko-KR" altLang="en-US"/>
               <a:t>둘째 수준</a:t>
             </a:r>
           </a:p>
           <a:p>
             <a:pPr lvl="2"/>
             <a:r>
-              <a:rPr lang="ko-KR" altLang="en-US" smtClean="0"/>
+              <a:rPr lang="ko-KR" altLang="en-US"/>
               <a:t>셋째 수준</a:t>
             </a:r>
           </a:p>
           <a:p>
             <a:pPr lvl="3"/>
             <a:r>
-              <a:rPr lang="ko-KR" altLang="en-US" smtClean="0"/>
+              <a:rPr lang="ko-KR" altLang="en-US"/>
               <a:t>넷째 수준</a:t>
             </a:r>
           </a:p>
           <a:p>
             <a:pPr lvl="4"/>
             <a:r>
-              <a:rPr lang="ko-KR" altLang="en-US" smtClean="0"/>
+              <a:rPr lang="ko-KR" altLang="en-US"/>
               <a:t>다섯째 수준</a:t>
             </a:r>
-            <a:endParaRPr lang="ko-KR" altLang="en-US"/>
           </a:p>
         </p:txBody>
       </p:sp>
@@ -2625,7 +2622,7 @@
           <a:p>
             <a:pPr lvl="0"/>
             <a:r>
-              <a:rPr lang="ko-KR" altLang="en-US" smtClean="0"/>
+              <a:rPr lang="ko-KR" altLang="en-US"/>
               <a:t>마스터 텍스트 스타일을 편집합니다</a:t>
             </a:r>
           </a:p>
@@ -2746,10 +2743,9 @@
           </a:lstStyle>
           <a:p>
             <a:r>
-              <a:rPr lang="ko-KR" altLang="en-US" smtClean="0"/>
+              <a:rPr lang="ko-KR" altLang="en-US"/>
               <a:t>마스터 제목 스타일 편집</a:t>
             </a:r>
-            <a:endParaRPr lang="ko-KR" altLang="en-US"/>
           </a:p>
         </p:txBody>
       </p:sp>
@@ -2873,7 +2869,7 @@
           <a:p>
             <a:pPr lvl="0"/>
             <a:r>
-              <a:rPr lang="ko-KR" altLang="en-US" smtClean="0"/>
+              <a:rPr lang="ko-KR" altLang="en-US"/>
               <a:t>마스터 텍스트 스타일을 편집합니다</a:t>
             </a:r>
           </a:p>
@@ -3000,10 +2996,9 @@
           <a:lstStyle/>
           <a:p>
             <a:r>
-              <a:rPr lang="ko-KR" altLang="en-US" smtClean="0"/>
+              <a:rPr lang="ko-KR" altLang="en-US"/>
               <a:t>마스터 제목 스타일 편집</a:t>
             </a:r>
-            <a:endParaRPr lang="ko-KR" altLang="en-US"/>
           </a:p>
         </p:txBody>
       </p:sp>
@@ -3034,38 +3029,37 @@
           <a:p>
             <a:pPr lvl="0"/>
             <a:r>
-              <a:rPr lang="ko-KR" altLang="en-US" smtClean="0"/>
+              <a:rPr lang="ko-KR" altLang="en-US"/>
               <a:t>마스터 텍스트 스타일을 편집합니다</a:t>
             </a:r>
           </a:p>
           <a:p>
             <a:pPr lvl="1"/>
             <a:r>
-              <a:rPr lang="ko-KR" altLang="en-US" smtClean="0"/>
+              <a:rPr lang="ko-KR" altLang="en-US"/>
               <a:t>둘째 수준</a:t>
             </a:r>
           </a:p>
           <a:p>
             <a:pPr lvl="2"/>
             <a:r>
-              <a:rPr lang="ko-KR" altLang="en-US" smtClean="0"/>
+              <a:rPr lang="ko-KR" altLang="en-US"/>
               <a:t>셋째 수준</a:t>
             </a:r>
           </a:p>
           <a:p>
             <a:pPr lvl="3"/>
             <a:r>
-              <a:rPr lang="ko-KR" altLang="en-US" smtClean="0"/>
+              <a:rPr lang="ko-KR" altLang="en-US"/>
               <a:t>넷째 수준</a:t>
             </a:r>
           </a:p>
           <a:p>
             <a:pPr lvl="4"/>
             <a:r>
-              <a:rPr lang="ko-KR" altLang="en-US" smtClean="0"/>
+              <a:rPr lang="ko-KR" altLang="en-US"/>
               <a:t>다섯째 수준</a:t>
             </a:r>
-            <a:endParaRPr lang="ko-KR" altLang="en-US"/>
           </a:p>
         </p:txBody>
       </p:sp>
@@ -3497,161 +3491,8 @@
           <a:lstStyle/>
           <a:p>
             <a:r>
-              <a:rPr lang="ko-KR" altLang="en-US" dirty="0" smtClean="0"/>
+              <a:rPr lang="ko-KR" altLang="en-US" dirty="0"/>
               <a:t>일시 </a:t>
-            </a:r>
-            <a:r>
-              <a:rPr lang="en-US" altLang="ko-KR" dirty="0" smtClean="0"/>
-              <a:t>: </a:t>
-            </a:r>
-            <a:r>
-              <a:rPr lang="ko-KR" altLang="en-US" dirty="0" smtClean="0"/>
-              <a:t>일요일 </a:t>
-            </a:r>
-            <a:r>
-              <a:rPr lang="en-US" altLang="ko-KR" dirty="0" smtClean="0"/>
-              <a:t>1</a:t>
-            </a:r>
-            <a:r>
-              <a:rPr lang="ko-KR" altLang="en-US" dirty="0" smtClean="0"/>
-              <a:t>시</a:t>
-            </a:r>
-            <a:endParaRPr lang="en-US" altLang="ko-KR" dirty="0"/>
-          </a:p>
-          <a:p>
-            <a:endParaRPr lang="en-US" altLang="ko-KR" dirty="0" smtClean="0"/>
-          </a:p>
-          <a:p>
-            <a:r>
-              <a:rPr lang="ko-KR" altLang="en-US" dirty="0" smtClean="0"/>
-              <a:t>목표 </a:t>
-            </a:r>
-            <a:r>
-              <a:rPr lang="en-US" altLang="ko-KR" dirty="0" smtClean="0"/>
-              <a:t>: </a:t>
-            </a:r>
-            <a:r>
-              <a:rPr lang="ko-KR" altLang="en-US" dirty="0" err="1" smtClean="0"/>
-              <a:t>프로그래머스</a:t>
-            </a:r>
-            <a:r>
-              <a:rPr lang="ko-KR" altLang="en-US" dirty="0" smtClean="0"/>
-              <a:t> </a:t>
-            </a:r>
-            <a:r>
-              <a:rPr lang="en-US" altLang="ko-KR" dirty="0" smtClean="0"/>
-              <a:t>3</a:t>
-            </a:r>
-            <a:r>
-              <a:rPr lang="ko-KR" altLang="en-US" dirty="0" smtClean="0"/>
-              <a:t>레벨 마스터</a:t>
-            </a:r>
-            <a:endParaRPr lang="en-US" altLang="ko-KR" dirty="0" smtClean="0"/>
-          </a:p>
-          <a:p>
-            <a:endParaRPr lang="en-US" altLang="ko-KR" dirty="0" smtClean="0"/>
-          </a:p>
-          <a:p>
-            <a:r>
-              <a:rPr lang="ko-KR" altLang="en-US" dirty="0" err="1" smtClean="0"/>
-              <a:t>지각비</a:t>
-            </a:r>
-            <a:r>
-              <a:rPr lang="ko-KR" altLang="en-US" dirty="0" smtClean="0"/>
-              <a:t> </a:t>
-            </a:r>
-            <a:r>
-              <a:rPr lang="en-US" altLang="ko-KR" dirty="0" smtClean="0"/>
-              <a:t>: </a:t>
-            </a:r>
-            <a:r>
-              <a:rPr lang="ko-KR" altLang="en-US" dirty="0" smtClean="0"/>
-              <a:t>늦거나 </a:t>
-            </a:r>
-            <a:r>
-              <a:rPr lang="ko-KR" altLang="en-US" dirty="0" err="1" smtClean="0"/>
-              <a:t>안오면</a:t>
-            </a:r>
-            <a:r>
-              <a:rPr lang="ko-KR" altLang="en-US" dirty="0" smtClean="0"/>
-              <a:t> 천원 </a:t>
-            </a:r>
-            <a:r>
-              <a:rPr lang="en-US" altLang="ko-KR" dirty="0" smtClean="0"/>
-              <a:t>-&gt; </a:t>
-            </a:r>
-            <a:r>
-              <a:rPr lang="ko-KR" altLang="en-US" dirty="0" smtClean="0"/>
-              <a:t>채지훈께</a:t>
-            </a:r>
-            <a:endParaRPr lang="en-US" altLang="ko-KR" dirty="0"/>
-          </a:p>
-          <a:p>
-            <a:endParaRPr lang="en-US" altLang="ko-KR" dirty="0" smtClean="0"/>
-          </a:p>
-          <a:p>
-            <a:r>
-              <a:rPr lang="ko-KR" altLang="en-US" dirty="0" smtClean="0"/>
-              <a:t>발표 준비 </a:t>
-            </a:r>
-            <a:r>
-              <a:rPr lang="ko-KR" altLang="en-US" dirty="0" err="1" smtClean="0"/>
-              <a:t>안하는경우</a:t>
-            </a:r>
-            <a:r>
-              <a:rPr lang="ko-KR" altLang="en-US" dirty="0" smtClean="0"/>
-              <a:t> </a:t>
-            </a:r>
-            <a:r>
-              <a:rPr lang="en-US" altLang="ko-KR" dirty="0" smtClean="0"/>
-              <a:t>: 3</a:t>
-            </a:r>
-            <a:r>
-              <a:rPr lang="ko-KR" altLang="en-US" dirty="0" smtClean="0"/>
-              <a:t>천원</a:t>
-            </a:r>
-            <a:endParaRPr lang="en-US" altLang="ko-KR" dirty="0" smtClean="0"/>
-          </a:p>
-          <a:p>
-            <a:r>
-              <a:rPr lang="ko-KR" altLang="en-US" dirty="0" smtClean="0"/>
-              <a:t>회식 없음</a:t>
-            </a:r>
-            <a:endParaRPr lang="en-US" altLang="ko-KR" dirty="0" smtClean="0"/>
-          </a:p>
-          <a:p>
-            <a:endParaRPr lang="en-US" altLang="ko-KR" dirty="0" smtClean="0"/>
-          </a:p>
-          <a:p>
-            <a:r>
-              <a:rPr lang="ko-KR" altLang="en-US" dirty="0" smtClean="0"/>
-              <a:t>누구 </a:t>
-            </a:r>
-            <a:r>
-              <a:rPr lang="ko-KR" altLang="en-US" dirty="0" err="1" smtClean="0"/>
-              <a:t>안와도</a:t>
-            </a:r>
-            <a:r>
-              <a:rPr lang="ko-KR" altLang="en-US" dirty="0" smtClean="0"/>
-              <a:t> </a:t>
-            </a:r>
-            <a:r>
-              <a:rPr lang="ko-KR" altLang="en-US" dirty="0" err="1" smtClean="0"/>
-              <a:t>미루는거</a:t>
-            </a:r>
-            <a:r>
-              <a:rPr lang="ko-KR" altLang="en-US" dirty="0" smtClean="0"/>
-              <a:t> 없음 무조건 진행</a:t>
-            </a:r>
-            <a:endParaRPr lang="en-US" altLang="ko-KR" dirty="0"/>
-          </a:p>
-          <a:p>
-            <a:endParaRPr lang="en-US" altLang="ko-KR" dirty="0" smtClean="0"/>
-          </a:p>
-          <a:p>
-            <a:r>
-              <a:rPr lang="ko-KR" altLang="en-US" dirty="0"/>
-              <a:t>언어 </a:t>
             </a:r>
             <a:r>
               <a:rPr lang="en-US" altLang="ko-KR" dirty="0"/>
@@ -3659,31 +3500,180 @@
             </a:r>
             <a:r>
               <a:rPr lang="ko-KR" altLang="en-US" dirty="0"/>
+              <a:t>일요일 </a:t>
+            </a:r>
+            <a:r>
+              <a:rPr lang="en-US" altLang="ko-KR" dirty="0"/>
+              <a:t>1</a:t>
+            </a:r>
+            <a:r>
+              <a:rPr lang="ko-KR" altLang="en-US" dirty="0"/>
+              <a:t>시</a:t>
+            </a:r>
+            <a:endParaRPr lang="en-US" altLang="ko-KR" dirty="0"/>
+          </a:p>
+          <a:p>
+            <a:endParaRPr lang="en-US" altLang="ko-KR" dirty="0"/>
+          </a:p>
+          <a:p>
+            <a:r>
+              <a:rPr lang="ko-KR" altLang="en-US" dirty="0"/>
+              <a:t>목표 </a:t>
+            </a:r>
+            <a:r>
+              <a:rPr lang="en-US" altLang="ko-KR" dirty="0"/>
+              <a:t>: </a:t>
+            </a:r>
+            <a:r>
+              <a:rPr lang="ko-KR" altLang="en-US" dirty="0" err="1"/>
+              <a:t>프로그래머스</a:t>
+            </a:r>
+            <a:r>
+              <a:rPr lang="ko-KR" altLang="en-US" dirty="0"/>
+              <a:t> </a:t>
+            </a:r>
+            <a:r>
+              <a:rPr lang="en-US" altLang="ko-KR" dirty="0"/>
+              <a:t>3</a:t>
+            </a:r>
+            <a:r>
+              <a:rPr lang="ko-KR" altLang="en-US" dirty="0"/>
+              <a:t>레벨 마스터</a:t>
+            </a:r>
+            <a:endParaRPr lang="en-US" altLang="ko-KR" dirty="0"/>
+          </a:p>
+          <a:p>
+            <a:endParaRPr lang="en-US" altLang="ko-KR" dirty="0"/>
+          </a:p>
+          <a:p>
+            <a:r>
+              <a:rPr lang="ko-KR" altLang="en-US" dirty="0" err="1"/>
+              <a:t>지각비</a:t>
+            </a:r>
+            <a:r>
+              <a:rPr lang="ko-KR" altLang="en-US" dirty="0"/>
+              <a:t> </a:t>
+            </a:r>
+            <a:r>
+              <a:rPr lang="en-US" altLang="ko-KR" dirty="0"/>
+              <a:t>: </a:t>
+            </a:r>
+            <a:r>
+              <a:rPr lang="ko-KR" altLang="en-US" dirty="0"/>
+              <a:t>늦거나 </a:t>
+            </a:r>
+            <a:r>
+              <a:rPr lang="ko-KR" altLang="en-US" dirty="0" err="1"/>
+              <a:t>안오면</a:t>
+            </a:r>
+            <a:r>
+              <a:rPr lang="ko-KR" altLang="en-US" dirty="0"/>
+              <a:t> 천원 </a:t>
+            </a:r>
+            <a:r>
+              <a:rPr lang="en-US" altLang="ko-KR" dirty="0"/>
+              <a:t>-&gt; </a:t>
+            </a:r>
+            <a:r>
+              <a:rPr lang="ko-KR" altLang="en-US" dirty="0"/>
+              <a:t>채지훈께</a:t>
+            </a:r>
+            <a:endParaRPr lang="en-US" altLang="ko-KR" dirty="0"/>
+          </a:p>
+          <a:p>
+            <a:endParaRPr lang="en-US" altLang="ko-KR" dirty="0"/>
+          </a:p>
+          <a:p>
+            <a:r>
+              <a:rPr lang="ko-KR" altLang="en-US" dirty="0"/>
+              <a:t>발표 준비 </a:t>
+            </a:r>
+            <a:r>
+              <a:rPr lang="ko-KR" altLang="en-US" dirty="0" err="1"/>
+              <a:t>안하는경우</a:t>
+            </a:r>
+            <a:r>
+              <a:rPr lang="ko-KR" altLang="en-US" dirty="0"/>
+              <a:t> </a:t>
+            </a:r>
+            <a:r>
+              <a:rPr lang="en-US" altLang="ko-KR" dirty="0"/>
+              <a:t>: 3</a:t>
+            </a:r>
+            <a:r>
+              <a:rPr lang="ko-KR" altLang="en-US" dirty="0"/>
+              <a:t>천원</a:t>
+            </a:r>
+            <a:endParaRPr lang="en-US" altLang="ko-KR" dirty="0"/>
+          </a:p>
+          <a:p>
+            <a:r>
+              <a:rPr lang="ko-KR" altLang="en-US" dirty="0"/>
+              <a:t>회식 없음</a:t>
+            </a:r>
+            <a:endParaRPr lang="en-US" altLang="ko-KR" dirty="0"/>
+          </a:p>
+          <a:p>
+            <a:endParaRPr lang="en-US" altLang="ko-KR" dirty="0"/>
+          </a:p>
+          <a:p>
+            <a:r>
+              <a:rPr lang="ko-KR" altLang="en-US" dirty="0"/>
+              <a:t>누구 </a:t>
+            </a:r>
+            <a:r>
+              <a:rPr lang="ko-KR" altLang="en-US" dirty="0" err="1"/>
+              <a:t>안와도</a:t>
+            </a:r>
+            <a:r>
+              <a:rPr lang="ko-KR" altLang="en-US" dirty="0"/>
+              <a:t> </a:t>
+            </a:r>
+            <a:r>
+              <a:rPr lang="ko-KR" altLang="en-US" dirty="0" err="1"/>
+              <a:t>미루는거</a:t>
+            </a:r>
+            <a:r>
+              <a:rPr lang="ko-KR" altLang="en-US" dirty="0"/>
+              <a:t> 없음 무조건 진행</a:t>
+            </a:r>
+            <a:endParaRPr lang="en-US" altLang="ko-KR" dirty="0"/>
+          </a:p>
+          <a:p>
+            <a:endParaRPr lang="en-US" altLang="ko-KR" dirty="0"/>
+          </a:p>
+          <a:p>
+            <a:r>
+              <a:rPr lang="ko-KR" altLang="en-US" dirty="0"/>
+              <a:t>언어 </a:t>
+            </a:r>
+            <a:r>
+              <a:rPr lang="en-US" altLang="ko-KR" dirty="0"/>
+              <a:t>: </a:t>
+            </a:r>
+            <a:r>
+              <a:rPr lang="ko-KR" altLang="en-US" dirty="0"/>
               <a:t>자바</a:t>
             </a:r>
             <a:r>
               <a:rPr lang="en-US" altLang="ko-KR" dirty="0"/>
-              <a:t>(JAVA) ^_^, JDK </a:t>
-            </a:r>
-            <a:r>
-              <a:rPr lang="en-US" altLang="ko-KR" dirty="0" smtClean="0"/>
-              <a:t>8</a:t>
-            </a:r>
-          </a:p>
-          <a:p>
-            <a:endParaRPr lang="en-US" altLang="ko-KR" dirty="0" smtClean="0"/>
-          </a:p>
-          <a:p>
-            <a:r>
-              <a:rPr lang="ko-KR" altLang="en-US" dirty="0" smtClean="0"/>
+              <a:t>(JAVA) ^_^, JDK 8</a:t>
+            </a:r>
+          </a:p>
+          <a:p>
+            <a:endParaRPr lang="en-US" altLang="ko-KR" dirty="0"/>
+          </a:p>
+          <a:p>
+            <a:r>
+              <a:rPr lang="ko-KR" altLang="en-US" dirty="0"/>
               <a:t>준비물 </a:t>
             </a:r>
             <a:r>
-              <a:rPr lang="en-US" altLang="ko-KR" dirty="0" smtClean="0"/>
+              <a:rPr lang="en-US" altLang="ko-KR" dirty="0"/>
               <a:t>: </a:t>
             </a:r>
             <a:r>
-              <a:rPr lang="ko-KR" altLang="en-US" dirty="0" smtClean="0"/>
+              <a:rPr lang="ko-KR" altLang="en-US" dirty="0"/>
               <a:t>개인 노트북</a:t>
             </a:r>
             <a:endParaRPr lang="en-US" altLang="ko-KR" dirty="0"/>
@@ -3693,93 +3683,93 @@
           </a:p>
           <a:p>
             <a:r>
-              <a:rPr lang="ko-KR" altLang="en-US" dirty="0" smtClean="0"/>
+              <a:rPr lang="ko-KR" altLang="en-US" dirty="0"/>
               <a:t>발표 </a:t>
             </a:r>
             <a:r>
-              <a:rPr lang="en-US" altLang="ko-KR" dirty="0" smtClean="0"/>
+              <a:rPr lang="en-US" altLang="ko-KR" dirty="0"/>
               <a:t>: </a:t>
             </a:r>
             <a:r>
-              <a:rPr lang="ko-KR" altLang="en-US" dirty="0" smtClean="0"/>
+              <a:rPr lang="ko-KR" altLang="en-US" dirty="0"/>
               <a:t>다들 준비</a:t>
             </a:r>
             <a:r>
-              <a:rPr lang="en-US" altLang="ko-KR" dirty="0" smtClean="0"/>
+              <a:rPr lang="en-US" altLang="ko-KR" dirty="0"/>
               <a:t>, </a:t>
             </a:r>
             <a:r>
-              <a:rPr lang="ko-KR" altLang="en-US" dirty="0" smtClean="0"/>
+              <a:rPr lang="ko-KR" altLang="en-US" dirty="0"/>
               <a:t>당일 랜덤 발표</a:t>
             </a:r>
-            <a:endParaRPr lang="en-US" altLang="ko-KR" dirty="0" smtClean="0"/>
-          </a:p>
-          <a:p>
-            <a:r>
-              <a:rPr lang="ko-KR" altLang="en-US" dirty="0" smtClean="0"/>
+            <a:endParaRPr lang="en-US" altLang="ko-KR" dirty="0"/>
+          </a:p>
+          <a:p>
+            <a:r>
+              <a:rPr lang="ko-KR" altLang="en-US" dirty="0"/>
               <a:t>문제 풀이 </a:t>
             </a:r>
             <a:r>
-              <a:rPr lang="en-US" altLang="ko-KR" dirty="0" smtClean="0"/>
+              <a:rPr lang="en-US" altLang="ko-KR" dirty="0"/>
               <a:t>: </a:t>
             </a:r>
             <a:r>
-              <a:rPr lang="ko-KR" altLang="en-US" dirty="0" smtClean="0"/>
+              <a:rPr lang="ko-KR" altLang="en-US" dirty="0"/>
               <a:t>엑셀에 정리 </a:t>
             </a:r>
             <a:r>
-              <a:rPr lang="en-US" altLang="ko-KR" dirty="0" smtClean="0"/>
+              <a:rPr lang="en-US" altLang="ko-KR" dirty="0"/>
               <a:t>or </a:t>
             </a:r>
             <a:r>
-              <a:rPr lang="ko-KR" altLang="en-US" dirty="0" err="1" smtClean="0"/>
+              <a:rPr lang="ko-KR" altLang="en-US" dirty="0" err="1"/>
               <a:t>노션</a:t>
             </a:r>
-            <a:endParaRPr lang="en-US" altLang="ko-KR" dirty="0" smtClean="0"/>
-          </a:p>
-          <a:p>
             <a:endParaRPr lang="en-US" altLang="ko-KR" dirty="0"/>
           </a:p>
           <a:p>
-            <a:r>
-              <a:rPr lang="en-US" altLang="ko-KR" dirty="0" err="1" smtClean="0"/>
+            <a:endParaRPr lang="en-US" altLang="ko-KR" dirty="0"/>
+          </a:p>
+          <a:p>
+            <a:r>
+              <a:rPr lang="en-US" altLang="ko-KR" dirty="0" err="1"/>
               <a:t>Github</a:t>
             </a:r>
             <a:r>
-              <a:rPr lang="en-US" altLang="ko-KR" dirty="0" smtClean="0"/>
+              <a:rPr lang="en-US" altLang="ko-KR" dirty="0"/>
               <a:t>, </a:t>
             </a:r>
             <a:r>
-              <a:rPr lang="ko-KR" altLang="en-US" dirty="0" err="1" smtClean="0"/>
+              <a:rPr lang="ko-KR" altLang="en-US" dirty="0" err="1"/>
               <a:t>블로그</a:t>
             </a:r>
             <a:r>
-              <a:rPr lang="en-US" altLang="ko-KR" dirty="0" smtClean="0"/>
+              <a:rPr lang="en-US" altLang="ko-KR" dirty="0"/>
               <a:t>, PPT </a:t>
             </a:r>
             <a:r>
-              <a:rPr lang="ko-KR" altLang="en-US" dirty="0" smtClean="0"/>
+              <a:rPr lang="ko-KR" altLang="en-US" dirty="0"/>
               <a:t>각자 알아서 발표준비</a:t>
             </a:r>
             <a:r>
-              <a:rPr lang="en-US" altLang="ko-KR" dirty="0" smtClean="0"/>
+              <a:rPr lang="en-US" altLang="ko-KR" dirty="0"/>
               <a:t> + </a:t>
             </a:r>
             <a:r>
-              <a:rPr lang="ko-KR" altLang="en-US" dirty="0" smtClean="0"/>
+              <a:rPr lang="ko-KR" altLang="en-US" dirty="0"/>
               <a:t>코딩문제 준비</a:t>
             </a:r>
-            <a:endParaRPr lang="en-US" altLang="ko-KR" dirty="0" smtClean="0"/>
-          </a:p>
-          <a:p>
             <a:endParaRPr lang="en-US" altLang="ko-KR" dirty="0"/>
           </a:p>
           <a:p>
-            <a:r>
-              <a:rPr lang="ko-KR" altLang="en-US" dirty="0" smtClean="0"/>
+            <a:endParaRPr lang="en-US" altLang="ko-KR" dirty="0"/>
+          </a:p>
+          <a:p>
+            <a:r>
+              <a:rPr lang="ko-KR" altLang="en-US" dirty="0"/>
               <a:t>이론 발표준비</a:t>
             </a:r>
-            <a:endParaRPr lang="en-US" altLang="ko-KR" dirty="0" smtClean="0"/>
+            <a:endParaRPr lang="en-US" altLang="ko-KR" dirty="0"/>
           </a:p>
           <a:p>
             <a:r>
@@ -3787,54 +3777,54 @@
               <a:t>문제 </a:t>
             </a:r>
             <a:r>
-              <a:rPr lang="en-US" altLang="ko-KR" dirty="0" smtClean="0"/>
+              <a:rPr lang="en-US" altLang="ko-KR" dirty="0"/>
               <a:t>1</a:t>
             </a:r>
             <a:r>
-              <a:rPr lang="ko-KR" altLang="en-US" dirty="0" smtClean="0"/>
+              <a:rPr lang="ko-KR" altLang="en-US" dirty="0"/>
               <a:t>개 </a:t>
             </a:r>
             <a:r>
-              <a:rPr lang="en-US" altLang="ko-KR" dirty="0" smtClean="0"/>
+              <a:rPr lang="en-US" altLang="ko-KR" dirty="0"/>
               <a:t>(</a:t>
             </a:r>
             <a:r>
-              <a:rPr lang="ko-KR" altLang="en-US" dirty="0" smtClean="0"/>
+              <a:rPr lang="ko-KR" altLang="en-US" dirty="0"/>
               <a:t>발표자가 준비 및 발표</a:t>
             </a:r>
             <a:r>
-              <a:rPr lang="en-US" altLang="ko-KR" dirty="0" smtClean="0"/>
+              <a:rPr lang="en-US" altLang="ko-KR" dirty="0"/>
               <a:t>)</a:t>
             </a:r>
           </a:p>
           <a:p>
             <a:r>
-              <a:rPr lang="ko-KR" altLang="en-US" dirty="0" smtClean="0"/>
+              <a:rPr lang="ko-KR" altLang="en-US" dirty="0"/>
               <a:t>문제 </a:t>
             </a:r>
             <a:r>
-              <a:rPr lang="en-US" altLang="ko-KR" dirty="0" smtClean="0"/>
+              <a:rPr lang="en-US" altLang="ko-KR" dirty="0"/>
               <a:t>2</a:t>
             </a:r>
             <a:r>
-              <a:rPr lang="ko-KR" altLang="en-US" dirty="0" smtClean="0"/>
+              <a:rPr lang="ko-KR" altLang="en-US" dirty="0"/>
               <a:t>개 </a:t>
             </a:r>
             <a:r>
-              <a:rPr lang="en-US" altLang="ko-KR" dirty="0" smtClean="0"/>
+              <a:rPr lang="en-US" altLang="ko-KR" dirty="0"/>
               <a:t>(</a:t>
             </a:r>
             <a:r>
-              <a:rPr lang="ko-KR" altLang="en-US" dirty="0" smtClean="0"/>
+              <a:rPr lang="ko-KR" altLang="en-US" dirty="0"/>
               <a:t>다음 주 풀어올 문제 다같이 선정</a:t>
             </a:r>
             <a:r>
-              <a:rPr lang="en-US" altLang="ko-KR" dirty="0" smtClean="0"/>
+              <a:rPr lang="en-US" altLang="ko-KR" dirty="0"/>
               <a:t>)</a:t>
             </a:r>
           </a:p>
           <a:p>
-            <a:endParaRPr lang="en-US" altLang="ko-KR" dirty="0" smtClean="0"/>
+            <a:endParaRPr lang="en-US" altLang="ko-KR" dirty="0"/>
           </a:p>
         </p:txBody>
       </p:sp>
@@ -3848,13 +3838,6 @@
   <p:clrMapOvr>
     <a:masterClrMapping/>
   </p:clrMapOvr>
-  <p:timing>
-    <p:tnLst>
-      <p:par>
-        <p:cTn id="1" dur="indefinite" restart="never" nodeType="tmRoot"/>
-      </p:par>
-    </p:tnLst>
-  </p:timing>
 </p:sld>
 </file>
 
@@ -3897,7 +3880,7 @@
           <a:lstStyle/>
           <a:p>
             <a:r>
-              <a:rPr lang="ko-KR" altLang="en-US" dirty="0" smtClean="0"/>
+              <a:rPr lang="ko-KR" altLang="en-US" dirty="0"/>
               <a:t>커리큘럼</a:t>
             </a:r>
             <a:endParaRPr lang="en-US" altLang="ko-KR" dirty="0"/>
@@ -3931,19 +3914,15 @@
               <a:t>1</a:t>
             </a:r>
             <a:r>
-              <a:rPr lang="ko-KR" altLang="en-US" dirty="0" smtClean="0"/>
+              <a:rPr lang="ko-KR" altLang="en-US" dirty="0"/>
               <a:t>주차</a:t>
             </a:r>
-            <a:endParaRPr lang="en-US" altLang="ko-KR" dirty="0" smtClean="0"/>
-          </a:p>
-          <a:p>
-            <a:r>
-              <a:rPr lang="ko-KR" altLang="en-US" dirty="0" smtClean="0"/>
-              <a:t>✅ </a:t>
-            </a:r>
-            <a:r>
-              <a:rPr lang="ko-KR" altLang="en-US" dirty="0"/>
-              <a:t>완전탐색</a:t>
+            <a:endParaRPr lang="en-US" altLang="ko-KR" dirty="0"/>
+          </a:p>
+          <a:p>
+            <a:r>
+              <a:rPr lang="ko-KR" altLang="en-US" dirty="0"/>
+              <a:t>✅ 완전탐색</a:t>
             </a:r>
           </a:p>
           <a:p>
@@ -3955,56 +3934,48 @@
           <a:p>
             <a:r>
               <a:rPr lang="ko-KR" altLang="en-US" dirty="0"/>
-              <a:t>✅ </a:t>
-            </a:r>
-            <a:r>
-              <a:rPr lang="ko-KR" altLang="en-US" dirty="0" smtClean="0"/>
-              <a:t>문자열</a:t>
-            </a:r>
-            <a:endParaRPr lang="en-US" altLang="ko-KR" dirty="0" smtClean="0"/>
-          </a:p>
-          <a:p>
-            <a:r>
-              <a:rPr lang="ko-KR" altLang="en-US" dirty="0" smtClean="0"/>
+              <a:t>✅ 문자열</a:t>
+            </a:r>
+            <a:endParaRPr lang="en-US" altLang="ko-KR" dirty="0"/>
+          </a:p>
+          <a:p>
+            <a:r>
+              <a:rPr lang="ko-KR" altLang="en-US" dirty="0"/>
               <a:t>삼성 코딩 테스트 문제</a:t>
             </a:r>
-            <a:endParaRPr lang="en-US" altLang="ko-KR" dirty="0" smtClean="0"/>
-          </a:p>
-          <a:p>
-            <a:r>
-              <a:rPr lang="ko-KR" altLang="en-US" dirty="0" err="1" smtClean="0"/>
+            <a:endParaRPr lang="en-US" altLang="ko-KR" dirty="0"/>
+          </a:p>
+          <a:p>
+            <a:r>
+              <a:rPr lang="ko-KR" altLang="en-US" dirty="0" err="1"/>
               <a:t>프로그래머스</a:t>
             </a:r>
             <a:r>
-              <a:rPr lang="en-US" altLang="ko-KR" dirty="0" smtClean="0"/>
+              <a:rPr lang="en-US" altLang="ko-KR" dirty="0"/>
               <a:t>(</a:t>
             </a:r>
             <a:r>
-              <a:rPr lang="ko-KR" altLang="en-US" dirty="0" smtClean="0"/>
+              <a:rPr lang="ko-KR" altLang="en-US" dirty="0"/>
               <a:t>코딩테스트 연습</a:t>
             </a:r>
             <a:r>
               <a:rPr lang="en-US" altLang="ko-KR" dirty="0"/>
-              <a:t> </a:t>
-            </a:r>
-            <a:r>
-              <a:rPr lang="en-US" altLang="ko-KR" dirty="0" smtClean="0"/>
+              <a:t> -&gt; </a:t>
+            </a:r>
+            <a:r>
+              <a:rPr lang="ko-KR" altLang="en-US" dirty="0"/>
+              <a:t>완전탐색 </a:t>
+            </a:r>
+            <a:r>
+              <a:rPr lang="en-US" altLang="ko-KR" dirty="0"/>
               <a:t>-&gt; </a:t>
             </a:r>
             <a:r>
-              <a:rPr lang="ko-KR" altLang="en-US" dirty="0" smtClean="0"/>
-              <a:t>완전탐색 </a:t>
-            </a:r>
-            <a:r>
-              <a:rPr lang="en-US" altLang="ko-KR" dirty="0" smtClean="0"/>
-              <a:t>-&gt; </a:t>
-            </a:r>
-            <a:r>
-              <a:rPr lang="ko-KR" altLang="en-US" dirty="0" smtClean="0"/>
+              <a:rPr lang="ko-KR" altLang="en-US" dirty="0"/>
               <a:t>숫자야구</a:t>
             </a:r>
             <a:r>
-              <a:rPr lang="en-US" altLang="ko-KR" dirty="0" smtClean="0"/>
+              <a:rPr lang="en-US" altLang="ko-KR" dirty="0"/>
               <a:t>)</a:t>
             </a:r>
           </a:p>
@@ -4032,23 +4003,19 @@
           <a:lstStyle/>
           <a:p>
             <a:r>
-              <a:rPr lang="en-US" altLang="ko-KR" dirty="0" smtClean="0"/>
+              <a:rPr lang="en-US" altLang="ko-KR" dirty="0"/>
               <a:t>2 </a:t>
             </a:r>
             <a:r>
-              <a:rPr lang="ko-KR" altLang="en-US" dirty="0" smtClean="0"/>
+              <a:rPr lang="ko-KR" altLang="en-US" dirty="0"/>
               <a:t>주차</a:t>
             </a:r>
-            <a:endParaRPr lang="en-US" altLang="ko-KR" dirty="0" smtClean="0"/>
-          </a:p>
-          <a:p>
-            <a:r>
-              <a:rPr lang="ko-KR" altLang="en-US" dirty="0" smtClean="0"/>
-              <a:t>✅ </a:t>
-            </a:r>
-            <a:r>
-              <a:rPr lang="ko-KR" altLang="en-US" dirty="0"/>
-              <a:t>리스트</a:t>
+            <a:endParaRPr lang="en-US" altLang="ko-KR" dirty="0"/>
+          </a:p>
+          <a:p>
+            <a:r>
+              <a:rPr lang="ko-KR" altLang="en-US" dirty="0"/>
+              <a:t>✅ 리스트</a:t>
             </a:r>
             <a:r>
               <a:rPr lang="en-US" altLang="ko-KR" dirty="0"/>
@@ -4125,14 +4092,14 @@
               <a:t>3</a:t>
             </a:r>
             <a:r>
-              <a:rPr lang="ko-KR" altLang="en-US" dirty="0" smtClean="0"/>
+              <a:rPr lang="ko-KR" altLang="en-US" dirty="0"/>
               <a:t>주차</a:t>
             </a:r>
-            <a:endParaRPr lang="en-US" altLang="ko-KR" dirty="0" smtClean="0"/>
-          </a:p>
-          <a:p>
-            <a:r>
-              <a:rPr lang="ko-KR" altLang="en-US" dirty="0" smtClean="0"/>
+            <a:endParaRPr lang="en-US" altLang="ko-KR" dirty="0"/>
+          </a:p>
+          <a:p>
+            <a:r>
+              <a:rPr lang="ko-KR" altLang="en-US" dirty="0"/>
               <a:t>✅ </a:t>
             </a:r>
             <a:r>
@@ -4194,32 +4161,32 @@
               <a:t>4</a:t>
             </a:r>
             <a:r>
-              <a:rPr lang="ko-KR" altLang="en-US" dirty="0" smtClean="0"/>
+              <a:rPr lang="ko-KR" altLang="en-US" dirty="0"/>
               <a:t>주차</a:t>
             </a:r>
-            <a:endParaRPr lang="en-US" altLang="ko-KR" dirty="0" smtClean="0"/>
-          </a:p>
-          <a:p>
-            <a:r>
-              <a:rPr lang="ko-KR" altLang="en-US" dirty="0" smtClean="0"/>
+            <a:endParaRPr lang="en-US" altLang="ko-KR" dirty="0"/>
+          </a:p>
+          <a:p>
+            <a:r>
+              <a:rPr lang="ko-KR" altLang="en-US" dirty="0"/>
               <a:t>✅ 책 순서</a:t>
             </a:r>
             <a:r>
-              <a:rPr lang="en-US" altLang="ko-KR" dirty="0" smtClean="0"/>
+              <a:rPr lang="en-US" altLang="ko-KR" dirty="0"/>
               <a:t>(</a:t>
             </a:r>
             <a:r>
-              <a:rPr lang="ko-KR" altLang="en-US" dirty="0" smtClean="0"/>
+              <a:rPr lang="ko-KR" altLang="en-US" dirty="0"/>
               <a:t>알고리즘 문제해결 전략</a:t>
             </a:r>
             <a:r>
-              <a:rPr lang="en-US" altLang="ko-KR" dirty="0" smtClean="0"/>
+              <a:rPr lang="en-US" altLang="ko-KR" dirty="0"/>
               <a:t>)</a:t>
             </a:r>
           </a:p>
           <a:p>
             <a:r>
-              <a:rPr lang="ko-KR" altLang="en-US" dirty="0" smtClean="0"/>
+              <a:rPr lang="ko-KR" altLang="en-US" dirty="0"/>
               <a:t>진행 하면서 정하기</a:t>
             </a:r>
             <a:endParaRPr lang="en-US" altLang="ko-KR" dirty="0"/>
@@ -4236,13 +4203,6 @@
   <p:clrMapOvr>
     <a:masterClrMapping/>
   </p:clrMapOvr>
-  <p:timing>
-    <p:tnLst>
-      <p:par>
-        <p:cTn id="1" dur="indefinite" restart="never" nodeType="tmRoot"/>
-      </p:par>
-    </p:tnLst>
-  </p:timing>
 </p:sld>
 </file>
 
@@ -4263,10 +4223,49 @@
           <a:chExt cx="0" cy="0"/>
         </a:xfrm>
       </p:grpSpPr>
+      <p:sp>
+        <p:nvSpPr>
+          <p:cNvPr id="3" name="내용 개체 틀 2">
+            <a:extLst>
+              <a:ext uri="{FF2B5EF4-FFF2-40B4-BE49-F238E27FC236}">
+                <a16:creationId xmlns:a16="http://schemas.microsoft.com/office/drawing/2014/main" id="{85A49B20-4BFB-4551-A939-07D12C1E547B}"/>
+              </a:ext>
+            </a:extLst>
+          </p:cNvPr>
+          <p:cNvSpPr>
+            <a:spLocks noGrp="1"/>
+          </p:cNvSpPr>
+          <p:nvPr>
+            <p:ph idx="1"/>
+          </p:nvPr>
+        </p:nvSpPr>
+        <p:spPr/>
+        <p:txBody>
+          <a:bodyPr/>
+          <a:lstStyle/>
+          <a:p>
+            <a:pPr marL="0" indent="0">
+              <a:buNone/>
+            </a:pPr>
+            <a:r>
+              <a:rPr lang="ko-KR" altLang="en-US" dirty="0"/>
+              <a:t>일요일 오전 </a:t>
+            </a:r>
+            <a:r>
+              <a:rPr lang="en-US" altLang="ko-KR" dirty="0"/>
+              <a:t>9</a:t>
+            </a:r>
+            <a:r>
+              <a:rPr lang="ko-KR" altLang="en-US" dirty="0"/>
+              <a:t>시 전까지 자료 업로드</a:t>
+            </a:r>
+          </a:p>
+        </p:txBody>
+      </p:sp>
     </p:spTree>
     <p:extLst>
       <p:ext uri="{BB962C8B-B14F-4D97-AF65-F5344CB8AC3E}">
-        <p14:creationId xmlns:p14="http://schemas.microsoft.com/office/powerpoint/2010/main" val="97558114"/>
+        <p14:creationId xmlns:p14="http://schemas.microsoft.com/office/powerpoint/2010/main" val="803038786"/>
       </p:ext>
     </p:extLst>
   </p:cSld>

</xml_diff>